<commit_message>
Aktualizacja oraz kodów systemów transmisji bezprzewodowych + user manual dla HC-12
</commit_message>
<xml_diff>
--- a/Prezentacja.pptx
+++ b/Prezentacja.pptx
@@ -5,18 +5,19 @@
     <p:sldMasterId id="2147483649" r:id="rId1"/>
   </p:sldMasterIdLst>
   <p:notesMasterIdLst>
-    <p:notesMasterId r:id="rId8"/>
+    <p:notesMasterId r:id="rId9"/>
   </p:notesMasterIdLst>
   <p:handoutMasterIdLst>
-    <p:handoutMasterId r:id="rId9"/>
+    <p:handoutMasterId r:id="rId10"/>
   </p:handoutMasterIdLst>
   <p:sldIdLst>
     <p:sldId id="256" r:id="rId2"/>
     <p:sldId id="265" r:id="rId3"/>
     <p:sldId id="266" r:id="rId4"/>
     <p:sldId id="267" r:id="rId5"/>
-    <p:sldId id="268" r:id="rId6"/>
-    <p:sldId id="269" r:id="rId7"/>
+    <p:sldId id="270" r:id="rId6"/>
+    <p:sldId id="268" r:id="rId7"/>
+    <p:sldId id="269" r:id="rId8"/>
   </p:sldIdLst>
   <p:sldSz cx="9144000" cy="6858000" type="screen4x3"/>
   <p:notesSz cx="6797675" cy="9926638"/>
@@ -268,7 +269,7 @@
               <a:pPr>
                 <a:defRPr/>
               </a:pPr>
-              <a:t>01.04.2020</a:t>
+              <a:t>10.04.2020</a:t>
             </a:fld>
             <a:endParaRPr lang="pl-PL"/>
           </a:p>
@@ -481,7 +482,7 @@
               <a:pPr>
                 <a:defRPr/>
               </a:pPr>
-              <a:t>01.04.2020</a:t>
+              <a:t>10.04.2020</a:t>
             </a:fld>
             <a:endParaRPr lang="pl-PL"/>
           </a:p>
@@ -7119,7 +7120,7 @@
         <p:spPr>
           <a:xfrm>
             <a:off x="1331640" y="908720"/>
-            <a:ext cx="7560840" cy="2585323"/>
+            <a:ext cx="7560840" cy="5909310"/>
           </a:xfrm>
           <a:prstGeom prst="rect">
             <a:avLst/>
@@ -7132,6 +7133,7 @@
           </a:bodyPr>
           <a:lstStyle/>
           <a:p>
+            <a:pPr algn="just"/>
             <a:r>
               <a:rPr lang="pl-PL" dirty="0"/>
               <a:t>Pierwszym zadaniem było fizyczne połączenie ze sobą modułów radiowych oraz mikrokontrolerów. Do mojej pracy dyplomowej wybrałem następujące systemy radiowe:</a:t>
@@ -7180,12 +7182,21 @@
             <a:endParaRPr lang="pl-PL" dirty="0"/>
           </a:p>
           <a:p>
+            <a:pPr lvl="1"/>
             <a:endParaRPr lang="pl-PL" dirty="0"/>
           </a:p>
           <a:p>
+            <a:pPr algn="just"/>
             <a:r>
               <a:rPr lang="pl-PL" dirty="0"/>
-              <a:t>Wyżej wymienione systemy podłączyłem do mikrokontrolerów </a:t>
+              <a:t>W celu realizacji pracy niezbędne są co najmniej 2 sztuki z każdego wybranego systemu radiowego, jeden w trybie pracy jako nadajnik oraz drugi w trybie pracy jako odbiornik.</a:t>
+            </a:r>
+          </a:p>
+          <a:p>
+            <a:pPr algn="just"/>
+            <a:r>
+              <a:rPr lang="pl-PL" dirty="0"/>
+              <a:t>Dodatkowo każdy moduł pracujący w trybie nadajnika podłączony zostanie do mikrokontrolera </a:t>
             </a:r>
             <a:r>
               <a:rPr lang="pl-PL" dirty="0" err="1"/>
@@ -7193,7 +7204,108 @@
             </a:r>
             <a:r>
               <a:rPr lang="pl-PL" dirty="0"/>
-              <a:t>.</a:t>
+              <a:t> Uno. Moduły pracujące w trybie odbiornika połączone będą z jednym mikrokontrolerem </a:t>
+            </a:r>
+            <a:r>
+              <a:rPr lang="pl-PL" dirty="0" err="1"/>
+              <a:t>Arduino</a:t>
+            </a:r>
+            <a:r>
+              <a:rPr lang="pl-PL" dirty="0"/>
+              <a:t> mega.</a:t>
+            </a:r>
+          </a:p>
+          <a:p>
+            <a:pPr algn="just"/>
+            <a:r>
+              <a:rPr lang="pl-PL" dirty="0"/>
+              <a:t>Wybrany sprzęt łącznie:</a:t>
+            </a:r>
+          </a:p>
+          <a:p>
+            <a:pPr marL="800100" lvl="1" indent="-342900">
+              <a:buFont typeface="Arial" panose="020B0604020202020204" pitchFamily="34" charset="0"/>
+              <a:buChar char="•"/>
+            </a:pPr>
+            <a:r>
+              <a:rPr lang="pl-PL" dirty="0"/>
+              <a:t>2x HC-12</a:t>
+            </a:r>
+          </a:p>
+          <a:p>
+            <a:pPr marL="800100" lvl="1" indent="-342900">
+              <a:buFont typeface="Arial" panose="020B0604020202020204" pitchFamily="34" charset="0"/>
+              <a:buChar char="•"/>
+            </a:pPr>
+            <a:r>
+              <a:rPr lang="pl-PL" dirty="0"/>
+              <a:t>2x </a:t>
+            </a:r>
+            <a:r>
+              <a:rPr lang="pl-PL" dirty="0" err="1"/>
+              <a:t>LoRa</a:t>
+            </a:r>
+            <a:endParaRPr lang="pl-PL" dirty="0"/>
+          </a:p>
+          <a:p>
+            <a:pPr marL="800100" lvl="1" indent="-342900">
+              <a:buFont typeface="Arial" panose="020B0604020202020204" pitchFamily="34" charset="0"/>
+              <a:buChar char="•"/>
+            </a:pPr>
+            <a:r>
+              <a:rPr lang="pl-PL" dirty="0"/>
+              <a:t>2x NRF24L01</a:t>
+            </a:r>
+          </a:p>
+          <a:p>
+            <a:pPr marL="800100" lvl="1" indent="-342900">
+              <a:buFont typeface="Arial" panose="020B0604020202020204" pitchFamily="34" charset="0"/>
+              <a:buChar char="•"/>
+            </a:pPr>
+            <a:r>
+              <a:rPr lang="pl-PL" dirty="0"/>
+              <a:t>2x </a:t>
+            </a:r>
+            <a:r>
+              <a:rPr lang="pl-PL" dirty="0" err="1"/>
+              <a:t>ZigBee</a:t>
+            </a:r>
+            <a:endParaRPr lang="pl-PL" dirty="0"/>
+          </a:p>
+          <a:p>
+            <a:pPr marL="800100" lvl="1" indent="-342900">
+              <a:buFont typeface="Arial" panose="020B0604020202020204" pitchFamily="34" charset="0"/>
+              <a:buChar char="•"/>
+            </a:pPr>
+            <a:r>
+              <a:rPr lang="pl-PL" dirty="0"/>
+              <a:t>4x </a:t>
+            </a:r>
+            <a:r>
+              <a:rPr lang="pl-PL" dirty="0" err="1"/>
+              <a:t>Arduino</a:t>
+            </a:r>
+            <a:r>
+              <a:rPr lang="pl-PL" dirty="0"/>
+              <a:t> Uno</a:t>
+            </a:r>
+          </a:p>
+          <a:p>
+            <a:pPr marL="800100" lvl="1" indent="-342900">
+              <a:buFont typeface="Arial" panose="020B0604020202020204" pitchFamily="34" charset="0"/>
+              <a:buChar char="•"/>
+            </a:pPr>
+            <a:r>
+              <a:rPr lang="pl-PL" dirty="0"/>
+              <a:t>1x </a:t>
+            </a:r>
+            <a:r>
+              <a:rPr lang="pl-PL" dirty="0" err="1"/>
+              <a:t>Arduino</a:t>
+            </a:r>
+            <a:r>
+              <a:rPr lang="pl-PL" dirty="0"/>
+              <a:t> Mega</a:t>
             </a:r>
           </a:p>
         </p:txBody>
@@ -7246,6 +7358,76 @@
         <p:spPr>
           <a:xfrm>
             <a:off x="1403648" y="116632"/>
+            <a:ext cx="7560840" cy="523220"/>
+          </a:xfrm>
+          <a:prstGeom prst="rect">
+            <a:avLst/>
+          </a:prstGeom>
+          <a:noFill/>
+        </p:spPr>
+        <p:txBody>
+          <a:bodyPr wrap="square" rtlCol="0">
+            <a:spAutoFit/>
+          </a:bodyPr>
+          <a:lstStyle/>
+          <a:p>
+            <a:pPr algn="ctr"/>
+            <a:r>
+              <a:rPr lang="pl-PL" sz="2800" dirty="0"/>
+              <a:t>Zestawienie platformy sprzętowej. HC-12</a:t>
+            </a:r>
+            <a:endParaRPr lang="en-US" sz="2800" dirty="0"/>
+          </a:p>
+        </p:txBody>
+      </p:sp>
+    </p:spTree>
+    <p:extLst>
+      <p:ext uri="{BB962C8B-B14F-4D97-AF65-F5344CB8AC3E}">
+        <p14:creationId xmlns:p14="http://schemas.microsoft.com/office/powerpoint/2010/main" val="167193993"/>
+      </p:ext>
+    </p:extLst>
+  </p:cSld>
+  <p:clrMapOvr>
+    <a:masterClrMapping/>
+  </p:clrMapOvr>
+  <p:transition>
+    <p:randomBar/>
+  </p:transition>
+</p:sld>
+</file>
+
+<file path=ppt/slides/slide6.xml><?xml version="1.0" encoding="utf-8"?>
+<p:sld xmlns:a="http://schemas.openxmlformats.org/drawingml/2006/main" xmlns:r="http://schemas.openxmlformats.org/officeDocument/2006/relationships" xmlns:p="http://schemas.openxmlformats.org/presentationml/2006/main">
+  <p:cSld>
+    <p:spTree>
+      <p:nvGrpSpPr>
+        <p:cNvPr id="1" name=""/>
+        <p:cNvGrpSpPr/>
+        <p:nvPr/>
+      </p:nvGrpSpPr>
+      <p:grpSpPr>
+        <a:xfrm>
+          <a:off x="0" y="0"/>
+          <a:ext cx="0" cy="0"/>
+          <a:chOff x="0" y="0"/>
+          <a:chExt cx="0" cy="0"/>
+        </a:xfrm>
+      </p:grpSpPr>
+      <p:sp>
+        <p:nvSpPr>
+          <p:cNvPr id="6" name="TextBox 5">
+            <a:extLst>
+              <a:ext uri="{FF2B5EF4-FFF2-40B4-BE49-F238E27FC236}">
+                <a16:creationId xmlns:a16="http://schemas.microsoft.com/office/drawing/2014/main" id="{4999CE9E-E011-4C1E-B6A2-873E85058375}"/>
+              </a:ext>
+            </a:extLst>
+          </p:cNvPr>
+          <p:cNvSpPr txBox="1"/>
+          <p:nvPr/>
+        </p:nvSpPr>
+        <p:spPr>
+          <a:xfrm>
+            <a:off x="1403648" y="116632"/>
             <a:ext cx="7560840" cy="954107"/>
           </a:xfrm>
           <a:prstGeom prst="rect">
@@ -7329,7 +7511,7 @@
 </p:sld>
 </file>
 
-<file path=ppt/slides/slide6.xml><?xml version="1.0" encoding="utf-8"?>
+<file path=ppt/slides/slide7.xml><?xml version="1.0" encoding="utf-8"?>
 <p:sld xmlns:a="http://schemas.openxmlformats.org/drawingml/2006/main" xmlns:r="http://schemas.openxmlformats.org/officeDocument/2006/relationships" xmlns:p="http://schemas.openxmlformats.org/presentationml/2006/main">
   <p:cSld>
     <p:spTree>

</xml_diff>